<commit_message>
Fixed last few typos in 5505 video06
</commit_message>
<xml_diff>
--- a/introduction-to-r/results/v06-slides-and-speaker-notes.pptx
+++ b/introduction-to-r/results/v06-slides-and-speaker-notes.pptx
@@ -15956,7 +15956,7 @@
             </a:r>
             <a:r>
               <a:rPr/>
-              <a:t>measurementn</a:t>
+              <a:t>measurement</a:t>
             </a:r>
             <a:r>
               <a:rPr/>
@@ -20806,10 +20806,10 @@
             </a:r>
           </a:p>
           <a:p>
-            <a:pPr lvl="2"/>
-            <a:r>
-              <a:rPr/>
-              <a:t>There are 3*2*2=12 measurements</a:t>
+            <a:pPr lvl="3"/>
+            <a:r>
+              <a:rPr/>
+              <a:t>There are 3 measurements per subject</a:t>
             </a:r>
           </a:p>
         </p:txBody>
@@ -22490,14 +22490,7 @@
             <a:pPr lvl="2"/>
             <a:r>
               <a:rPr/>
-              <a:t>There are 26 subjects</a:t>
-            </a:r>
-          </a:p>
-          <a:p>
-            <a:pPr lvl="2"/>
-            <a:r>
-              <a:rPr/>
-              <a:t>There are 5*26=130 measurements</a:t>
+              <a:t>There are 25 subjects, 5 measurements</a:t>
             </a:r>
           </a:p>
         </p:txBody>
@@ -25114,7 +25107,7 @@
             <a:pPr lvl="2"/>
             <a:r>
               <a:rPr/>
-              <a:t>There are 3*11=33 measurements</a:t>
+              <a:t>Convert to one row per matched triple</a:t>
             </a:r>
           </a:p>
         </p:txBody>
@@ -27629,7 +27622,7 @@
             </a:r>
             <a:r>
               <a:rPr/>
-              <a:t>#2</a:t>
+              <a:t>#3</a:t>
             </a:r>
           </a:p>
         </p:txBody>
@@ -28559,7 +28552,7 @@
             <a:pPr lvl="2"/>
             <a:r>
               <a:rPr/>
-              <a:t>There are 3*2*2=12 measurements</a:t>
+              <a:t>40 subjects, 3*2*2=12 measurements</a:t>
             </a:r>
           </a:p>
         </p:txBody>

</xml_diff>